<commit_message>
Update How to make money with software.pptx
</commit_message>
<xml_diff>
--- a/How to make money with software.pptx
+++ b/How to make money with software.pptx
@@ -4,6 +4,9 @@
   <p:sldMasterIdLst>
     <p:sldMasterId id="2147483648" r:id="rId1"/>
   </p:sldMasterIdLst>
+  <p:notesMasterIdLst>
+    <p:notesMasterId r:id="rId9"/>
+  </p:notesMasterIdLst>
   <p:sldIdLst>
     <p:sldId id="256" r:id="rId2"/>
     <p:sldId id="257" r:id="rId3"/>
@@ -131,7 +134,7 @@
   <pc:docChgLst>
     <pc:chgData name="Ruo Feng Somers" userId="e05789add83f385b" providerId="LiveId" clId="{55FEF0CA-15A7-4B12-8759-94FEFB250766}"/>
     <pc:docChg chg="undo redo custSel addSld delSld modSld sldOrd">
-      <pc:chgData name="Ruo Feng Somers" userId="e05789add83f385b" providerId="LiveId" clId="{55FEF0CA-15A7-4B12-8759-94FEFB250766}" dt="2025-01-31T12:38:35.464" v="1385"/>
+      <pc:chgData name="Ruo Feng Somers" userId="e05789add83f385b" providerId="LiveId" clId="{55FEF0CA-15A7-4B12-8759-94FEFB250766}" dt="2025-02-08T09:25:46.931" v="1410" actId="20577"/>
       <pc:docMkLst>
         <pc:docMk/>
       </pc:docMkLst>
@@ -157,36 +160,12 @@
             <ac:spMk id="3" creationId="{31F96B4D-C142-E794-2BA0-3D481C566B37}"/>
           </ac:spMkLst>
         </pc:spChg>
-        <pc:spChg chg="add del">
-          <ac:chgData name="Ruo Feng Somers" userId="e05789add83f385b" providerId="LiveId" clId="{55FEF0CA-15A7-4B12-8759-94FEFB250766}" dt="2025-01-30T18:54:54.535" v="2" actId="478"/>
-          <ac:spMkLst>
-            <pc:docMk/>
-            <pc:sldMk cId="97217818" sldId="256"/>
-            <ac:spMk id="4" creationId="{136E4C6D-6BE3-606B-4D3B-D8B3DCE258A3}"/>
-          </ac:spMkLst>
-        </pc:spChg>
-        <pc:spChg chg="add mod">
-          <ac:chgData name="Ruo Feng Somers" userId="e05789add83f385b" providerId="LiveId" clId="{55FEF0CA-15A7-4B12-8759-94FEFB250766}" dt="2025-01-30T18:55:21.731" v="4"/>
-          <ac:spMkLst>
-            <pc:docMk/>
-            <pc:sldMk cId="97217818" sldId="256"/>
-            <ac:spMk id="5" creationId="{BE3A085B-A04A-FC3F-1D5C-EEC77C3BB5EB}"/>
-          </ac:spMkLst>
-        </pc:spChg>
         <pc:spChg chg="add mod ord">
           <ac:chgData name="Ruo Feng Somers" userId="e05789add83f385b" providerId="LiveId" clId="{55FEF0CA-15A7-4B12-8759-94FEFB250766}" dt="2025-01-30T19:01:33.049" v="128" actId="1076"/>
           <ac:spMkLst>
             <pc:docMk/>
             <pc:sldMk cId="97217818" sldId="256"/>
             <ac:spMk id="6" creationId="{9DA16D7C-2E53-46BC-1AB4-204F6D0386A4}"/>
-          </ac:spMkLst>
-        </pc:spChg>
-        <pc:spChg chg="add mod">
-          <ac:chgData name="Ruo Feng Somers" userId="e05789add83f385b" providerId="LiveId" clId="{55FEF0CA-15A7-4B12-8759-94FEFB250766}" dt="2025-01-30T18:56:34.339" v="15"/>
-          <ac:spMkLst>
-            <pc:docMk/>
-            <pc:sldMk cId="97217818" sldId="256"/>
-            <ac:spMk id="7" creationId="{F44E0D28-60C0-A195-ED3E-B32D4897C62F}"/>
           </ac:spMkLst>
         </pc:spChg>
         <pc:spChg chg="add mod ord">
@@ -205,22 +184,6 @@
             <ac:picMk id="4" creationId="{4A10238E-7CFD-558F-64AC-9338BDD890F4}"/>
           </ac:picMkLst>
         </pc:picChg>
-        <pc:picChg chg="add del mod">
-          <ac:chgData name="Ruo Feng Somers" userId="e05789add83f385b" providerId="LiveId" clId="{55FEF0CA-15A7-4B12-8759-94FEFB250766}" dt="2025-01-30T20:05:36.285" v="1121" actId="478"/>
-          <ac:picMkLst>
-            <pc:docMk/>
-            <pc:sldMk cId="97217818" sldId="256"/>
-            <ac:picMk id="5" creationId="{62BE5348-FB7E-ED3B-549E-9AF570A60CE6}"/>
-          </ac:picMkLst>
-        </pc:picChg>
-        <pc:picChg chg="add del mod">
-          <ac:chgData name="Ruo Feng Somers" userId="e05789add83f385b" providerId="LiveId" clId="{55FEF0CA-15A7-4B12-8759-94FEFB250766}" dt="2025-01-31T12:14:16.281" v="1265" actId="478"/>
-          <ac:picMkLst>
-            <pc:docMk/>
-            <pc:sldMk cId="97217818" sldId="256"/>
-            <ac:picMk id="7" creationId="{CA3CC111-7370-09D1-2073-7FDF125A8998}"/>
-          </ac:picMkLst>
-        </pc:picChg>
       </pc:sldChg>
       <pc:sldChg chg="addSp delSp modSp add mod modTransition modAnim">
         <pc:chgData name="Ruo Feng Somers" userId="e05789add83f385b" providerId="LiveId" clId="{55FEF0CA-15A7-4B12-8759-94FEFB250766}" dt="2025-01-31T12:14:09.727" v="1264" actId="962"/>
@@ -234,14 +197,6 @@
             <pc:docMk/>
             <pc:sldMk cId="482412586" sldId="257"/>
             <ac:spMk id="2" creationId="{ABADF796-7EB7-AAD2-81BC-76CFFF51CB3F}"/>
-          </ac:spMkLst>
-        </pc:spChg>
-        <pc:spChg chg="del mod">
-          <ac:chgData name="Ruo Feng Somers" userId="e05789add83f385b" providerId="LiveId" clId="{55FEF0CA-15A7-4B12-8759-94FEFB250766}" dt="2025-01-30T19:14:29.392" v="288" actId="478"/>
-          <ac:spMkLst>
-            <pc:docMk/>
-            <pc:sldMk cId="482412586" sldId="257"/>
-            <ac:spMk id="3" creationId="{802C01E3-0AA7-6305-38BC-697A24995FE8}"/>
           </ac:spMkLst>
         </pc:spChg>
         <pc:spChg chg="add mod">
@@ -260,14 +215,6 @@
             <ac:spMk id="4" creationId="{623B7484-2C5C-C66E-3D05-A849EBCDB436}"/>
           </ac:spMkLst>
         </pc:spChg>
-        <pc:spChg chg="add mod">
-          <ac:chgData name="Ruo Feng Somers" userId="e05789add83f385b" providerId="LiveId" clId="{55FEF0CA-15A7-4B12-8759-94FEFB250766}" dt="2025-01-30T19:22:52.301" v="477" actId="368"/>
-          <ac:spMkLst>
-            <pc:docMk/>
-            <pc:sldMk cId="482412586" sldId="257"/>
-            <ac:spMk id="5" creationId="{7D034528-0D0D-B25F-D338-4FDE14FF2302}"/>
-          </ac:spMkLst>
-        </pc:spChg>
         <pc:spChg chg="mod">
           <ac:chgData name="Ruo Feng Somers" userId="e05789add83f385b" providerId="LiveId" clId="{55FEF0CA-15A7-4B12-8759-94FEFB250766}" dt="2025-01-30T19:11:53.546" v="245" actId="14100"/>
           <ac:spMkLst>
@@ -282,14 +229,6 @@
             <pc:docMk/>
             <pc:sldMk cId="482412586" sldId="257"/>
             <ac:spMk id="7" creationId="{71BA70DE-3415-FFA7-35D9-968D4CAEACBD}"/>
-          </ac:spMkLst>
-        </pc:spChg>
-        <pc:spChg chg="del mod">
-          <ac:chgData name="Ruo Feng Somers" userId="e05789add83f385b" providerId="LiveId" clId="{55FEF0CA-15A7-4B12-8759-94FEFB250766}" dt="2025-01-30T19:11:58.746" v="247" actId="478"/>
-          <ac:spMkLst>
-            <pc:docMk/>
-            <pc:sldMk cId="482412586" sldId="257"/>
-            <ac:spMk id="8" creationId="{811A748C-8E0E-BECF-A87D-35EDA55D345D}"/>
           </ac:spMkLst>
         </pc:spChg>
         <pc:spChg chg="add mod">
@@ -308,22 +247,6 @@
             <ac:spMk id="10" creationId="{29321914-AB09-5F81-E5C2-7FBB0DEB5008}"/>
           </ac:spMkLst>
         </pc:spChg>
-        <pc:spChg chg="add del mod">
-          <ac:chgData name="Ruo Feng Somers" userId="e05789add83f385b" providerId="LiveId" clId="{55FEF0CA-15A7-4B12-8759-94FEFB250766}" dt="2025-01-30T19:32:56.966" v="737" actId="478"/>
-          <ac:spMkLst>
-            <pc:docMk/>
-            <pc:sldMk cId="482412586" sldId="257"/>
-            <ac:spMk id="12" creationId="{14E69124-BA07-B17B-CC9A-4354811B5F18}"/>
-          </ac:spMkLst>
-        </pc:spChg>
-        <pc:graphicFrameChg chg="add del mod modGraphic">
-          <ac:chgData name="Ruo Feng Somers" userId="e05789add83f385b" providerId="LiveId" clId="{55FEF0CA-15A7-4B12-8759-94FEFB250766}" dt="2025-01-30T19:16:30.416" v="295" actId="478"/>
-          <ac:graphicFrameMkLst>
-            <pc:docMk/>
-            <pc:sldMk cId="482412586" sldId="257"/>
-            <ac:graphicFrameMk id="5" creationId="{377B1A9B-5BAE-BA42-0043-A8B5EB1CE91A}"/>
-          </ac:graphicFrameMkLst>
-        </pc:graphicFrameChg>
         <pc:picChg chg="add mod">
           <ac:chgData name="Ruo Feng Somers" userId="e05789add83f385b" providerId="LiveId" clId="{55FEF0CA-15A7-4B12-8759-94FEFB250766}" dt="2025-01-31T12:14:09.727" v="1264" actId="962"/>
           <ac:picMkLst>
@@ -332,33 +255,9 @@
             <ac:picMk id="5" creationId="{99B8DF12-E54F-7A6B-0CF3-CF4EC8BA359C}"/>
           </ac:picMkLst>
         </pc:picChg>
-        <pc:picChg chg="add mod">
-          <ac:chgData name="Ruo Feng Somers" userId="e05789add83f385b" providerId="LiveId" clId="{55FEF0CA-15A7-4B12-8759-94FEFB250766}" dt="2025-01-30T19:41:16.083" v="784" actId="931"/>
-          <ac:picMkLst>
-            <pc:docMk/>
-            <pc:sldMk cId="482412586" sldId="257"/>
-            <ac:picMk id="14" creationId="{4DEDE1A4-F2FB-919F-C768-2435C8B1BDDF}"/>
-          </ac:picMkLst>
-        </pc:picChg>
-        <pc:picChg chg="add mod">
-          <ac:chgData name="Ruo Feng Somers" userId="e05789add83f385b" providerId="LiveId" clId="{55FEF0CA-15A7-4B12-8759-94FEFB250766}" dt="2025-01-30T19:41:46.760" v="793" actId="931"/>
-          <ac:picMkLst>
-            <pc:docMk/>
-            <pc:sldMk cId="482412586" sldId="257"/>
-            <ac:picMk id="16" creationId="{A1F7396E-5374-A564-44FE-F7998A5549EB}"/>
-          </ac:picMkLst>
-        </pc:picChg>
-        <pc:picChg chg="add del mod">
-          <ac:chgData name="Ruo Feng Somers" userId="e05789add83f385b" providerId="LiveId" clId="{55FEF0CA-15A7-4B12-8759-94FEFB250766}" dt="2025-01-31T12:14:07.327" v="1261" actId="478"/>
-          <ac:picMkLst>
-            <pc:docMk/>
-            <pc:sldMk cId="482412586" sldId="257"/>
-            <ac:picMk id="17" creationId="{62BE5348-FB7E-ED3B-549E-9AF570A60CE6}"/>
-          </ac:picMkLst>
-        </pc:picChg>
       </pc:sldChg>
-      <pc:sldChg chg="addSp delSp modSp add mod modTransition addAnim delAnim modAnim">
-        <pc:chgData name="Ruo Feng Somers" userId="e05789add83f385b" providerId="LiveId" clId="{55FEF0CA-15A7-4B12-8759-94FEFB250766}" dt="2025-01-30T20:05:44.143" v="1127" actId="962"/>
+      <pc:sldChg chg="addSp delSp modSp add mod modTransition addAnim delAnim modAnim modNotesTx">
+        <pc:chgData name="Ruo Feng Somers" userId="e05789add83f385b" providerId="LiveId" clId="{55FEF0CA-15A7-4B12-8759-94FEFB250766}" dt="2025-02-08T09:25:46.931" v="1410" actId="20577"/>
         <pc:sldMkLst>
           <pc:docMk/>
           <pc:sldMk cId="926558733" sldId="258"/>
@@ -371,14 +270,6 @@
             <ac:spMk id="2" creationId="{DA72455F-3B82-1EBD-CF69-33B999743BA4}"/>
           </ac:spMkLst>
         </pc:spChg>
-        <pc:spChg chg="del">
-          <ac:chgData name="Ruo Feng Somers" userId="e05789add83f385b" providerId="LiveId" clId="{55FEF0CA-15A7-4B12-8759-94FEFB250766}" dt="2025-01-30T19:43:15.422" v="841" actId="478"/>
-          <ac:spMkLst>
-            <pc:docMk/>
-            <pc:sldMk cId="926558733" sldId="258"/>
-            <ac:spMk id="3" creationId="{6DDF16AD-CA3E-2506-D35D-EE7A092E8F15}"/>
-          </ac:spMkLst>
-        </pc:spChg>
         <pc:spChg chg="add mod">
           <ac:chgData name="Ruo Feng Somers" userId="e05789add83f385b" providerId="LiveId" clId="{55FEF0CA-15A7-4B12-8759-94FEFB250766}" dt="2025-01-30T19:54:45.870" v="1031" actId="1076"/>
           <ac:spMkLst>
@@ -387,68 +278,12 @@
             <ac:spMk id="5" creationId="{144DF75E-AE23-B4CB-525C-6FCE0F387DC7}"/>
           </ac:spMkLst>
         </pc:spChg>
-        <pc:spChg chg="del mod">
-          <ac:chgData name="Ruo Feng Somers" userId="e05789add83f385b" providerId="LiveId" clId="{55FEF0CA-15A7-4B12-8759-94FEFB250766}" dt="2025-01-30T19:43:10.860" v="840"/>
-          <ac:spMkLst>
-            <pc:docMk/>
-            <pc:sldMk cId="926558733" sldId="258"/>
-            <ac:spMk id="7" creationId="{9BB216F5-BAE3-BF0B-656B-86D42C01D4E9}"/>
-          </ac:spMkLst>
-        </pc:spChg>
-        <pc:spChg chg="del">
-          <ac:chgData name="Ruo Feng Somers" userId="e05789add83f385b" providerId="LiveId" clId="{55FEF0CA-15A7-4B12-8759-94FEFB250766}" dt="2025-01-30T19:43:15.422" v="841" actId="478"/>
-          <ac:spMkLst>
-            <pc:docMk/>
-            <pc:sldMk cId="926558733" sldId="258"/>
-            <ac:spMk id="8" creationId="{3749FD65-9E5F-A41B-647F-CA9349D2E48C}"/>
-          </ac:spMkLst>
-        </pc:spChg>
-        <pc:spChg chg="add del mod">
-          <ac:chgData name="Ruo Feng Somers" userId="e05789add83f385b" providerId="LiveId" clId="{55FEF0CA-15A7-4B12-8759-94FEFB250766}" dt="2025-01-30T20:00:15.646" v="1051" actId="478"/>
-          <ac:spMkLst>
-            <pc:docMk/>
-            <pc:sldMk cId="926558733" sldId="258"/>
-            <ac:spMk id="9" creationId="{0BF619E1-E631-17A3-5575-BA5D0F5411C6}"/>
-          </ac:spMkLst>
-        </pc:spChg>
-        <pc:spChg chg="del mod">
-          <ac:chgData name="Ruo Feng Somers" userId="e05789add83f385b" providerId="LiveId" clId="{55FEF0CA-15A7-4B12-8759-94FEFB250766}" dt="2025-01-30T19:43:26.152" v="844" actId="478"/>
-          <ac:spMkLst>
-            <pc:docMk/>
-            <pc:sldMk cId="926558733" sldId="258"/>
-            <ac:spMk id="10" creationId="{CA0CA11B-686C-C76A-815A-529B55A31E02}"/>
-          </ac:spMkLst>
-        </pc:spChg>
         <pc:spChg chg="add del mod">
           <ac:chgData name="Ruo Feng Somers" userId="e05789add83f385b" providerId="LiveId" clId="{55FEF0CA-15A7-4B12-8759-94FEFB250766}" dt="2025-01-30T20:00:52.748" v="1063" actId="1076"/>
           <ac:spMkLst>
             <pc:docMk/>
             <pc:sldMk cId="926558733" sldId="258"/>
             <ac:spMk id="11" creationId="{FB30BA7F-BEF4-AEA6-C60C-7A0FD3F1C82A}"/>
-          </ac:spMkLst>
-        </pc:spChg>
-        <pc:spChg chg="add del mod">
-          <ac:chgData name="Ruo Feng Somers" userId="e05789add83f385b" providerId="LiveId" clId="{55FEF0CA-15A7-4B12-8759-94FEFB250766}" dt="2025-01-30T19:46:21.403" v="906" actId="478"/>
-          <ac:spMkLst>
-            <pc:docMk/>
-            <pc:sldMk cId="926558733" sldId="258"/>
-            <ac:spMk id="12" creationId="{D2814854-8A59-DD8F-8272-C65FAA16846F}"/>
-          </ac:spMkLst>
-        </pc:spChg>
-        <pc:spChg chg="add del mod">
-          <ac:chgData name="Ruo Feng Somers" userId="e05789add83f385b" providerId="LiveId" clId="{55FEF0CA-15A7-4B12-8759-94FEFB250766}" dt="2025-01-30T19:47:29.214" v="918" actId="11529"/>
-          <ac:spMkLst>
-            <pc:docMk/>
-            <pc:sldMk cId="926558733" sldId="258"/>
-            <ac:spMk id="13" creationId="{E9B288E9-453C-4311-F18B-0EDD4F84F6E9}"/>
-          </ac:spMkLst>
-        </pc:spChg>
-        <pc:spChg chg="add del mod">
-          <ac:chgData name="Ruo Feng Somers" userId="e05789add83f385b" providerId="LiveId" clId="{55FEF0CA-15A7-4B12-8759-94FEFB250766}" dt="2025-01-30T19:53:10.312" v="1017" actId="478"/>
-          <ac:spMkLst>
-            <pc:docMk/>
-            <pc:sldMk cId="926558733" sldId="258"/>
-            <ac:spMk id="14" creationId="{AA62AF4F-2112-EFD9-D3D9-2DF54C3EBFBC}"/>
           </ac:spMkLst>
         </pc:spChg>
         <pc:spChg chg="add mod">
@@ -481,14 +316,6 @@
           <pc:docMk/>
           <pc:sldMk cId="3952367604" sldId="258"/>
         </pc:sldMkLst>
-        <pc:spChg chg="mod">
-          <ac:chgData name="Ruo Feng Somers" userId="e05789add83f385b" providerId="LiveId" clId="{55FEF0CA-15A7-4B12-8759-94FEFB250766}" dt="2025-01-30T19:09:30.765" v="207"/>
-          <ac:spMkLst>
-            <pc:docMk/>
-            <pc:sldMk cId="3952367604" sldId="258"/>
-            <ac:spMk id="2" creationId="{AAC99EF6-0019-EE01-46BB-0C19121F9F81}"/>
-          </ac:spMkLst>
-        </pc:spChg>
       </pc:sldChg>
       <pc:sldChg chg="new del">
         <pc:chgData name="Ruo Feng Somers" userId="e05789add83f385b" providerId="LiveId" clId="{55FEF0CA-15A7-4B12-8759-94FEFB250766}" dt="2025-01-30T19:42:26.467" v="813" actId="47"/>
@@ -511,52 +338,12 @@
             <ac:spMk id="2" creationId="{7DD8F241-A8BF-6002-B8D2-1548989E1489}"/>
           </ac:spMkLst>
         </pc:spChg>
-        <pc:spChg chg="del">
-          <ac:chgData name="Ruo Feng Somers" userId="e05789add83f385b" providerId="LiveId" clId="{55FEF0CA-15A7-4B12-8759-94FEFB250766}" dt="2025-01-30T20:01:26.229" v="1069" actId="478"/>
-          <ac:spMkLst>
-            <pc:docMk/>
-            <pc:sldMk cId="122248223" sldId="259"/>
-            <ac:spMk id="3" creationId="{1CA2DFE5-F899-2944-1C57-704A63EDDD27}"/>
-          </ac:spMkLst>
-        </pc:spChg>
         <pc:spChg chg="mod">
           <ac:chgData name="Ruo Feng Somers" userId="e05789add83f385b" providerId="LiveId" clId="{55FEF0CA-15A7-4B12-8759-94FEFB250766}" dt="2025-01-31T12:38:33.087" v="1380" actId="14100"/>
           <ac:spMkLst>
             <pc:docMk/>
             <pc:sldMk cId="122248223" sldId="259"/>
             <ac:spMk id="4" creationId="{B780F222-2014-68B0-FAF7-7B6EB53F4E83}"/>
-          </ac:spMkLst>
-        </pc:spChg>
-        <pc:spChg chg="del">
-          <ac:chgData name="Ruo Feng Somers" userId="e05789add83f385b" providerId="LiveId" clId="{55FEF0CA-15A7-4B12-8759-94FEFB250766}" dt="2025-01-30T20:01:26.229" v="1069" actId="478"/>
-          <ac:spMkLst>
-            <pc:docMk/>
-            <pc:sldMk cId="122248223" sldId="259"/>
-            <ac:spMk id="7" creationId="{56C2641D-9383-9B3C-8E62-553087030800}"/>
-          </ac:spMkLst>
-        </pc:spChg>
-        <pc:spChg chg="del">
-          <ac:chgData name="Ruo Feng Somers" userId="e05789add83f385b" providerId="LiveId" clId="{55FEF0CA-15A7-4B12-8759-94FEFB250766}" dt="2025-01-30T20:01:26.229" v="1069" actId="478"/>
-          <ac:spMkLst>
-            <pc:docMk/>
-            <pc:sldMk cId="122248223" sldId="259"/>
-            <ac:spMk id="8" creationId="{05ED0764-0DDC-F74A-5E63-AA37EFCC8FCF}"/>
-          </ac:spMkLst>
-        </pc:spChg>
-        <pc:spChg chg="add del">
-          <ac:chgData name="Ruo Feng Somers" userId="e05789add83f385b" providerId="LiveId" clId="{55FEF0CA-15A7-4B12-8759-94FEFB250766}" dt="2025-01-31T12:17:16.623" v="1282" actId="22"/>
-          <ac:spMkLst>
-            <pc:docMk/>
-            <pc:sldMk cId="122248223" sldId="259"/>
-            <ac:spMk id="8" creationId="{D0004660-EA19-BE0B-23C0-390B55D2BFB3}"/>
-          </ac:spMkLst>
-        </pc:spChg>
-        <pc:spChg chg="add del mod">
-          <ac:chgData name="Ruo Feng Somers" userId="e05789add83f385b" providerId="LiveId" clId="{55FEF0CA-15A7-4B12-8759-94FEFB250766}" dt="2025-01-31T12:19:20.299" v="1297" actId="478"/>
-          <ac:spMkLst>
-            <pc:docMk/>
-            <pc:sldMk cId="122248223" sldId="259"/>
-            <ac:spMk id="9" creationId="{CD935595-DB0E-1D70-8980-2A99A312989D}"/>
           </ac:spMkLst>
         </pc:spChg>
         <pc:spChg chg="add mod ord">
@@ -567,28 +354,12 @@
             <ac:spMk id="10" creationId="{1DFEE081-31CE-4EA4-A9E2-E1EE023BB8ED}"/>
           </ac:spMkLst>
         </pc:spChg>
-        <pc:spChg chg="del">
-          <ac:chgData name="Ruo Feng Somers" userId="e05789add83f385b" providerId="LiveId" clId="{55FEF0CA-15A7-4B12-8759-94FEFB250766}" dt="2025-01-30T20:01:26.229" v="1069" actId="478"/>
-          <ac:spMkLst>
-            <pc:docMk/>
-            <pc:sldMk cId="122248223" sldId="259"/>
-            <ac:spMk id="10" creationId="{7C743CBD-A8A9-0CE6-88B5-59E169FB91F5}"/>
-          </ac:spMkLst>
-        </pc:spChg>
         <pc:picChg chg="add mod">
           <ac:chgData name="Ruo Feng Somers" userId="e05789add83f385b" providerId="LiveId" clId="{55FEF0CA-15A7-4B12-8759-94FEFB250766}" dt="2025-01-31T12:32:49.965" v="1323" actId="1076"/>
           <ac:picMkLst>
             <pc:docMk/>
             <pc:sldMk cId="122248223" sldId="259"/>
             <ac:picMk id="3" creationId="{F9978B46-6655-A512-48F1-3120911261A5}"/>
-          </ac:picMkLst>
-        </pc:picChg>
-        <pc:picChg chg="add del mod">
-          <ac:chgData name="Ruo Feng Somers" userId="e05789add83f385b" providerId="LiveId" clId="{55FEF0CA-15A7-4B12-8759-94FEFB250766}" dt="2025-01-31T12:14:22.524" v="1269" actId="478"/>
-          <ac:picMkLst>
-            <pc:docMk/>
-            <pc:sldMk cId="122248223" sldId="259"/>
-            <ac:picMk id="5" creationId="{982A1F85-160C-3D1F-AAAC-B6CA2F165533}"/>
           </ac:picMkLst>
         </pc:picChg>
       </pc:sldChg>
@@ -620,14 +391,6 @@
             <ac:spMk id="2" creationId="{5E301BAE-9ACF-0F34-E82E-C1D4B45899E8}"/>
           </ac:spMkLst>
         </pc:spChg>
-        <pc:picChg chg="add del mod">
-          <ac:chgData name="Ruo Feng Somers" userId="e05789add83f385b" providerId="LiveId" clId="{55FEF0CA-15A7-4B12-8759-94FEFB250766}" dt="2025-01-31T12:14:29.367" v="1273" actId="478"/>
-          <ac:picMkLst>
-            <pc:docMk/>
-            <pc:sldMk cId="3546818733" sldId="260"/>
-            <ac:picMk id="3" creationId="{87F6E431-E8D3-B7EC-0E01-4B889DC37E8F}"/>
-          </ac:picMkLst>
-        </pc:picChg>
         <pc:picChg chg="add mod">
           <ac:chgData name="Ruo Feng Somers" userId="e05789add83f385b" providerId="LiveId" clId="{55FEF0CA-15A7-4B12-8759-94FEFB250766}" dt="2025-01-31T12:14:30.064" v="1274"/>
           <ac:picMkLst>
@@ -658,14 +421,6 @@
             <ac:spMk id="2" creationId="{7096C5D2-FF7E-AEAF-0E86-E3FF579BB595}"/>
           </ac:spMkLst>
         </pc:spChg>
-        <pc:picChg chg="del">
-          <ac:chgData name="Ruo Feng Somers" userId="e05789add83f385b" providerId="LiveId" clId="{55FEF0CA-15A7-4B12-8759-94FEFB250766}" dt="2025-01-31T12:14:33.942" v="1275" actId="478"/>
-          <ac:picMkLst>
-            <pc:docMk/>
-            <pc:sldMk cId="4140527961" sldId="261"/>
-            <ac:picMk id="3" creationId="{5680E5F1-28B4-81A3-641B-A60CF9F6C915}"/>
-          </ac:picMkLst>
-        </pc:picChg>
         <pc:picChg chg="add mod">
           <ac:chgData name="Ruo Feng Somers" userId="e05789add83f385b" providerId="LiveId" clId="{55FEF0CA-15A7-4B12-8759-94FEFB250766}" dt="2025-01-31T12:14:34.480" v="1276"/>
           <ac:picMkLst>
@@ -710,6 +465,451 @@
 </pc:chgInfo>
 </file>
 
+<file path=ppt/notesMasters/notesMaster1.xml><?xml version="1.0" encoding="utf-8"?>
+<p:notesMaster xmlns:a="http://schemas.openxmlformats.org/drawingml/2006/main" xmlns:r="http://schemas.openxmlformats.org/officeDocument/2006/relationships" xmlns:p="http://schemas.openxmlformats.org/presentationml/2006/main">
+  <p:cSld>
+    <p:bg>
+      <p:bgRef idx="1001">
+        <a:schemeClr val="bg1"/>
+      </p:bgRef>
+    </p:bg>
+    <p:spTree>
+      <p:nvGrpSpPr>
+        <p:cNvPr id="1" name=""/>
+        <p:cNvGrpSpPr/>
+        <p:nvPr/>
+      </p:nvGrpSpPr>
+      <p:grpSpPr>
+        <a:xfrm>
+          <a:off x="0" y="0"/>
+          <a:ext cx="0" cy="0"/>
+          <a:chOff x="0" y="0"/>
+          <a:chExt cx="0" cy="0"/>
+        </a:xfrm>
+      </p:grpSpPr>
+      <p:sp>
+        <p:nvSpPr>
+          <p:cNvPr id="2" name="Tijdelijke aanduiding voor koptekst 1"/>
+          <p:cNvSpPr>
+            <a:spLocks noGrp="1"/>
+          </p:cNvSpPr>
+          <p:nvPr>
+            <p:ph type="hdr" sz="quarter"/>
+          </p:nvPr>
+        </p:nvSpPr>
+        <p:spPr>
+          <a:xfrm>
+            <a:off x="0" y="0"/>
+            <a:ext cx="2971800" cy="458788"/>
+          </a:xfrm>
+          <a:prstGeom prst="rect">
+            <a:avLst/>
+          </a:prstGeom>
+        </p:spPr>
+        <p:txBody>
+          <a:bodyPr vert="horz" lIns="91440" tIns="45720" rIns="91440" bIns="45720" rtlCol="0"/>
+          <a:lstStyle>
+            <a:lvl1pPr algn="l">
+              <a:defRPr sz="1200"/>
+            </a:lvl1pPr>
+          </a:lstStyle>
+          <a:p>
+            <a:endParaRPr lang="nl-NL"/>
+          </a:p>
+        </p:txBody>
+      </p:sp>
+      <p:sp>
+        <p:nvSpPr>
+          <p:cNvPr id="3" name="Tijdelijke aanduiding voor datum 2"/>
+          <p:cNvSpPr>
+            <a:spLocks noGrp="1"/>
+          </p:cNvSpPr>
+          <p:nvPr>
+            <p:ph type="dt" idx="1"/>
+          </p:nvPr>
+        </p:nvSpPr>
+        <p:spPr>
+          <a:xfrm>
+            <a:off x="3884613" y="0"/>
+            <a:ext cx="2971800" cy="458788"/>
+          </a:xfrm>
+          <a:prstGeom prst="rect">
+            <a:avLst/>
+          </a:prstGeom>
+        </p:spPr>
+        <p:txBody>
+          <a:bodyPr vert="horz" lIns="91440" tIns="45720" rIns="91440" bIns="45720" rtlCol="0"/>
+          <a:lstStyle>
+            <a:lvl1pPr algn="r">
+              <a:defRPr sz="1200"/>
+            </a:lvl1pPr>
+          </a:lstStyle>
+          <a:p>
+            <a:fld id="{7E26F585-9663-4692-A6EA-317E711EE4B0}" type="datetimeFigureOut">
+              <a:rPr lang="nl-NL" smtClean="0"/>
+              <a:t>8-2-2025</a:t>
+            </a:fld>
+            <a:endParaRPr lang="nl-NL"/>
+          </a:p>
+        </p:txBody>
+      </p:sp>
+      <p:sp>
+        <p:nvSpPr>
+          <p:cNvPr id="4" name="Tijdelijke aanduiding voor dia-afbeelding 3"/>
+          <p:cNvSpPr>
+            <a:spLocks noGrp="1" noRot="1" noChangeAspect="1"/>
+          </p:cNvSpPr>
+          <p:nvPr>
+            <p:ph type="sldImg" idx="2"/>
+          </p:nvPr>
+        </p:nvSpPr>
+        <p:spPr>
+          <a:xfrm>
+            <a:off x="685800" y="1143000"/>
+            <a:ext cx="5486400" cy="3086100"/>
+          </a:xfrm>
+          <a:prstGeom prst="rect">
+            <a:avLst/>
+          </a:prstGeom>
+          <a:noFill/>
+          <a:ln w="12700">
+            <a:solidFill>
+              <a:prstClr val="black"/>
+            </a:solidFill>
+          </a:ln>
+        </p:spPr>
+        <p:txBody>
+          <a:bodyPr vert="horz" lIns="91440" tIns="45720" rIns="91440" bIns="45720" rtlCol="0" anchor="ctr"/>
+          <a:lstStyle/>
+          <a:p>
+            <a:endParaRPr lang="nl-NL"/>
+          </a:p>
+        </p:txBody>
+      </p:sp>
+      <p:sp>
+        <p:nvSpPr>
+          <p:cNvPr id="5" name="Tijdelijke aanduiding voor notities 4"/>
+          <p:cNvSpPr>
+            <a:spLocks noGrp="1"/>
+          </p:cNvSpPr>
+          <p:nvPr>
+            <p:ph type="body" sz="quarter" idx="3"/>
+          </p:nvPr>
+        </p:nvSpPr>
+        <p:spPr>
+          <a:xfrm>
+            <a:off x="685800" y="4400550"/>
+            <a:ext cx="5486400" cy="3600450"/>
+          </a:xfrm>
+          <a:prstGeom prst="rect">
+            <a:avLst/>
+          </a:prstGeom>
+        </p:spPr>
+        <p:txBody>
+          <a:bodyPr vert="horz" lIns="91440" tIns="45720" rIns="91440" bIns="45720" rtlCol="0"/>
+          <a:lstStyle/>
+          <a:p>
+            <a:pPr lvl="0"/>
+            <a:r>
+              <a:rPr lang="nl-NL"/>
+              <a:t>Klikken om de tekststijl van het model te bewerken</a:t>
+            </a:r>
+          </a:p>
+          <a:p>
+            <a:pPr lvl="1"/>
+            <a:r>
+              <a:rPr lang="nl-NL"/>
+              <a:t>Tweede niveau</a:t>
+            </a:r>
+          </a:p>
+          <a:p>
+            <a:pPr lvl="2"/>
+            <a:r>
+              <a:rPr lang="nl-NL"/>
+              <a:t>Derde niveau</a:t>
+            </a:r>
+          </a:p>
+          <a:p>
+            <a:pPr lvl="3"/>
+            <a:r>
+              <a:rPr lang="nl-NL"/>
+              <a:t>Vierde niveau</a:t>
+            </a:r>
+          </a:p>
+          <a:p>
+            <a:pPr lvl="4"/>
+            <a:r>
+              <a:rPr lang="nl-NL"/>
+              <a:t>Vijfde niveau</a:t>
+            </a:r>
+          </a:p>
+        </p:txBody>
+      </p:sp>
+      <p:sp>
+        <p:nvSpPr>
+          <p:cNvPr id="6" name="Tijdelijke aanduiding voor voettekst 5"/>
+          <p:cNvSpPr>
+            <a:spLocks noGrp="1"/>
+          </p:cNvSpPr>
+          <p:nvPr>
+            <p:ph type="ftr" sz="quarter" idx="4"/>
+          </p:nvPr>
+        </p:nvSpPr>
+        <p:spPr>
+          <a:xfrm>
+            <a:off x="0" y="8685213"/>
+            <a:ext cx="2971800" cy="458787"/>
+          </a:xfrm>
+          <a:prstGeom prst="rect">
+            <a:avLst/>
+          </a:prstGeom>
+        </p:spPr>
+        <p:txBody>
+          <a:bodyPr vert="horz" lIns="91440" tIns="45720" rIns="91440" bIns="45720" rtlCol="0" anchor="b"/>
+          <a:lstStyle>
+            <a:lvl1pPr algn="l">
+              <a:defRPr sz="1200"/>
+            </a:lvl1pPr>
+          </a:lstStyle>
+          <a:p>
+            <a:endParaRPr lang="nl-NL"/>
+          </a:p>
+        </p:txBody>
+      </p:sp>
+      <p:sp>
+        <p:nvSpPr>
+          <p:cNvPr id="7" name="Tijdelijke aanduiding voor dianummer 6"/>
+          <p:cNvSpPr>
+            <a:spLocks noGrp="1"/>
+          </p:cNvSpPr>
+          <p:nvPr>
+            <p:ph type="sldNum" sz="quarter" idx="5"/>
+          </p:nvPr>
+        </p:nvSpPr>
+        <p:spPr>
+          <a:xfrm>
+            <a:off x="3884613" y="8685213"/>
+            <a:ext cx="2971800" cy="458787"/>
+          </a:xfrm>
+          <a:prstGeom prst="rect">
+            <a:avLst/>
+          </a:prstGeom>
+        </p:spPr>
+        <p:txBody>
+          <a:bodyPr vert="horz" lIns="91440" tIns="45720" rIns="91440" bIns="45720" rtlCol="0" anchor="b"/>
+          <a:lstStyle>
+            <a:lvl1pPr algn="r">
+              <a:defRPr sz="1200"/>
+            </a:lvl1pPr>
+          </a:lstStyle>
+          <a:p>
+            <a:fld id="{8374D233-B376-447C-ADAD-60B3FD5F19C9}" type="slidenum">
+              <a:rPr lang="nl-NL" smtClean="0"/>
+              <a:t>‹nr.›</a:t>
+            </a:fld>
+            <a:endParaRPr lang="nl-NL"/>
+          </a:p>
+        </p:txBody>
+      </p:sp>
+    </p:spTree>
+    <p:extLst>
+      <p:ext uri="{BB962C8B-B14F-4D97-AF65-F5344CB8AC3E}">
+        <p14:creationId xmlns:p14="http://schemas.microsoft.com/office/powerpoint/2010/main" val="2870720471"/>
+      </p:ext>
+    </p:extLst>
+  </p:cSld>
+  <p:clrMap bg1="lt1" tx1="dk1" bg2="lt2" tx2="dk2" accent1="accent1" accent2="accent2" accent3="accent3" accent4="accent4" accent5="accent5" accent6="accent6" hlink="hlink" folHlink="folHlink"/>
+  <p:notesStyle>
+    <a:lvl1pPr marL="0" algn="l" defTabSz="914400" rtl="0" eaLnBrk="1" latinLnBrk="0" hangingPunct="1">
+      <a:defRPr sz="1200" kern="1200">
+        <a:solidFill>
+          <a:schemeClr val="tx1"/>
+        </a:solidFill>
+        <a:latin typeface="+mn-lt"/>
+        <a:ea typeface="+mn-ea"/>
+        <a:cs typeface="+mn-cs"/>
+      </a:defRPr>
+    </a:lvl1pPr>
+    <a:lvl2pPr marL="457200" algn="l" defTabSz="914400" rtl="0" eaLnBrk="1" latinLnBrk="0" hangingPunct="1">
+      <a:defRPr sz="1200" kern="1200">
+        <a:solidFill>
+          <a:schemeClr val="tx1"/>
+        </a:solidFill>
+        <a:latin typeface="+mn-lt"/>
+        <a:ea typeface="+mn-ea"/>
+        <a:cs typeface="+mn-cs"/>
+      </a:defRPr>
+    </a:lvl2pPr>
+    <a:lvl3pPr marL="914400" algn="l" defTabSz="914400" rtl="0" eaLnBrk="1" latinLnBrk="0" hangingPunct="1">
+      <a:defRPr sz="1200" kern="1200">
+        <a:solidFill>
+          <a:schemeClr val="tx1"/>
+        </a:solidFill>
+        <a:latin typeface="+mn-lt"/>
+        <a:ea typeface="+mn-ea"/>
+        <a:cs typeface="+mn-cs"/>
+      </a:defRPr>
+    </a:lvl3pPr>
+    <a:lvl4pPr marL="1371600" algn="l" defTabSz="914400" rtl="0" eaLnBrk="1" latinLnBrk="0" hangingPunct="1">
+      <a:defRPr sz="1200" kern="1200">
+        <a:solidFill>
+          <a:schemeClr val="tx1"/>
+        </a:solidFill>
+        <a:latin typeface="+mn-lt"/>
+        <a:ea typeface="+mn-ea"/>
+        <a:cs typeface="+mn-cs"/>
+      </a:defRPr>
+    </a:lvl4pPr>
+    <a:lvl5pPr marL="1828800" algn="l" defTabSz="914400" rtl="0" eaLnBrk="1" latinLnBrk="0" hangingPunct="1">
+      <a:defRPr sz="1200" kern="1200">
+        <a:solidFill>
+          <a:schemeClr val="tx1"/>
+        </a:solidFill>
+        <a:latin typeface="+mn-lt"/>
+        <a:ea typeface="+mn-ea"/>
+        <a:cs typeface="+mn-cs"/>
+      </a:defRPr>
+    </a:lvl5pPr>
+    <a:lvl6pPr marL="2286000" algn="l" defTabSz="914400" rtl="0" eaLnBrk="1" latinLnBrk="0" hangingPunct="1">
+      <a:defRPr sz="1200" kern="1200">
+        <a:solidFill>
+          <a:schemeClr val="tx1"/>
+        </a:solidFill>
+        <a:latin typeface="+mn-lt"/>
+        <a:ea typeface="+mn-ea"/>
+        <a:cs typeface="+mn-cs"/>
+      </a:defRPr>
+    </a:lvl6pPr>
+    <a:lvl7pPr marL="2743200" algn="l" defTabSz="914400" rtl="0" eaLnBrk="1" latinLnBrk="0" hangingPunct="1">
+      <a:defRPr sz="1200" kern="1200">
+        <a:solidFill>
+          <a:schemeClr val="tx1"/>
+        </a:solidFill>
+        <a:latin typeface="+mn-lt"/>
+        <a:ea typeface="+mn-ea"/>
+        <a:cs typeface="+mn-cs"/>
+      </a:defRPr>
+    </a:lvl7pPr>
+    <a:lvl8pPr marL="3200400" algn="l" defTabSz="914400" rtl="0" eaLnBrk="1" latinLnBrk="0" hangingPunct="1">
+      <a:defRPr sz="1200" kern="1200">
+        <a:solidFill>
+          <a:schemeClr val="tx1"/>
+        </a:solidFill>
+        <a:latin typeface="+mn-lt"/>
+        <a:ea typeface="+mn-ea"/>
+        <a:cs typeface="+mn-cs"/>
+      </a:defRPr>
+    </a:lvl8pPr>
+    <a:lvl9pPr marL="3657600" algn="l" defTabSz="914400" rtl="0" eaLnBrk="1" latinLnBrk="0" hangingPunct="1">
+      <a:defRPr sz="1200" kern="1200">
+        <a:solidFill>
+          <a:schemeClr val="tx1"/>
+        </a:solidFill>
+        <a:latin typeface="+mn-lt"/>
+        <a:ea typeface="+mn-ea"/>
+        <a:cs typeface="+mn-cs"/>
+      </a:defRPr>
+    </a:lvl9pPr>
+  </p:notesStyle>
+</p:notesMaster>
+</file>
+
+<file path=ppt/notesSlides/notesSlide1.xml><?xml version="1.0" encoding="utf-8"?>
+<p:notes xmlns:a="http://schemas.openxmlformats.org/drawingml/2006/main" xmlns:r="http://schemas.openxmlformats.org/officeDocument/2006/relationships" xmlns:p="http://schemas.openxmlformats.org/presentationml/2006/main">
+  <p:cSld>
+    <p:spTree>
+      <p:nvGrpSpPr>
+        <p:cNvPr id="1" name=""/>
+        <p:cNvGrpSpPr/>
+        <p:nvPr/>
+      </p:nvGrpSpPr>
+      <p:grpSpPr>
+        <a:xfrm>
+          <a:off x="0" y="0"/>
+          <a:ext cx="0" cy="0"/>
+          <a:chOff x="0" y="0"/>
+          <a:chExt cx="0" cy="0"/>
+        </a:xfrm>
+      </p:grpSpPr>
+      <p:sp>
+        <p:nvSpPr>
+          <p:cNvPr id="2" name="Tijdelijke aanduiding voor dia-afbeelding 1"/>
+          <p:cNvSpPr>
+            <a:spLocks noGrp="1" noRot="1" noChangeAspect="1"/>
+          </p:cNvSpPr>
+          <p:nvPr>
+            <p:ph type="sldImg"/>
+          </p:nvPr>
+        </p:nvSpPr>
+        <p:spPr/>
+      </p:sp>
+      <p:sp>
+        <p:nvSpPr>
+          <p:cNvPr id="3" name="Tijdelijke aanduiding voor notities 2"/>
+          <p:cNvSpPr>
+            <a:spLocks noGrp="1"/>
+          </p:cNvSpPr>
+          <p:nvPr>
+            <p:ph type="body" idx="1"/>
+          </p:nvPr>
+        </p:nvSpPr>
+        <p:spPr/>
+        <p:txBody>
+          <a:bodyPr/>
+          <a:lstStyle/>
+          <a:p>
+            <a:r>
+              <a:rPr lang="en-US" dirty="0" err="1"/>
+              <a:t>Os</a:t>
+            </a:r>
+            <a:r>
+              <a:rPr lang="en-US" dirty="0"/>
+              <a:t> = operating </a:t>
+            </a:r>
+            <a:r>
+              <a:rPr lang="en-US" dirty="0" err="1"/>
+              <a:t>systeem</a:t>
+            </a:r>
+            <a:endParaRPr lang="nl-NL" dirty="0"/>
+          </a:p>
+        </p:txBody>
+      </p:sp>
+      <p:sp>
+        <p:nvSpPr>
+          <p:cNvPr id="4" name="Tijdelijke aanduiding voor dianummer 3"/>
+          <p:cNvSpPr>
+            <a:spLocks noGrp="1"/>
+          </p:cNvSpPr>
+          <p:nvPr>
+            <p:ph type="sldNum" sz="quarter" idx="5"/>
+          </p:nvPr>
+        </p:nvSpPr>
+        <p:spPr/>
+        <p:txBody>
+          <a:bodyPr/>
+          <a:lstStyle/>
+          <a:p>
+            <a:fld id="{8374D233-B376-447C-ADAD-60B3FD5F19C9}" type="slidenum">
+              <a:rPr lang="nl-NL" smtClean="0"/>
+              <a:t>3</a:t>
+            </a:fld>
+            <a:endParaRPr lang="nl-NL"/>
+          </a:p>
+        </p:txBody>
+      </p:sp>
+    </p:spTree>
+    <p:extLst>
+      <p:ext uri="{BB962C8B-B14F-4D97-AF65-F5344CB8AC3E}">
+        <p14:creationId xmlns:p14="http://schemas.microsoft.com/office/powerpoint/2010/main" val="2415161579"/>
+      </p:ext>
+    </p:extLst>
+  </p:cSld>
+  <p:clrMapOvr>
+    <a:masterClrMapping/>
+  </p:clrMapOvr>
+</p:notes>
+</file>
+
 <file path=ppt/slideLayouts/slideLayout1.xml><?xml version="1.0" encoding="utf-8"?>
 <p:sldLayout xmlns:a="http://schemas.openxmlformats.org/drawingml/2006/main" xmlns:r="http://schemas.openxmlformats.org/officeDocument/2006/relationships" xmlns:p="http://schemas.openxmlformats.org/presentationml/2006/main" type="title" preserve="1">
   <p:cSld name="Title Slide">
@@ -859,7 +1059,7 @@
           <a:p>
             <a:fld id="{D64660CB-3018-4B1C-BA22-7AC78AB2EFDE}" type="datetimeFigureOut">
               <a:rPr lang="nl-NL" smtClean="0"/>
-              <a:t>31-1-2025</a:t>
+              <a:t>8-2-2025</a:t>
             </a:fld>
             <a:endParaRPr lang="nl-NL" dirty="0"/>
           </a:p>
@@ -1059,7 +1259,7 @@
           <a:p>
             <a:fld id="{D64660CB-3018-4B1C-BA22-7AC78AB2EFDE}" type="datetimeFigureOut">
               <a:rPr lang="nl-NL" smtClean="0"/>
-              <a:t>31-1-2025</a:t>
+              <a:t>8-2-2025</a:t>
             </a:fld>
             <a:endParaRPr lang="nl-NL" dirty="0"/>
           </a:p>
@@ -1269,7 +1469,7 @@
           <a:p>
             <a:fld id="{D64660CB-3018-4B1C-BA22-7AC78AB2EFDE}" type="datetimeFigureOut">
               <a:rPr lang="nl-NL" smtClean="0"/>
-              <a:t>31-1-2025</a:t>
+              <a:t>8-2-2025</a:t>
             </a:fld>
             <a:endParaRPr lang="nl-NL" dirty="0"/>
           </a:p>
@@ -1469,7 +1669,7 @@
           <a:p>
             <a:fld id="{D64660CB-3018-4B1C-BA22-7AC78AB2EFDE}" type="datetimeFigureOut">
               <a:rPr lang="nl-NL" smtClean="0"/>
-              <a:t>31-1-2025</a:t>
+              <a:t>8-2-2025</a:t>
             </a:fld>
             <a:endParaRPr lang="nl-NL" dirty="0"/>
           </a:p>
@@ -1745,7 +1945,7 @@
           <a:p>
             <a:fld id="{D64660CB-3018-4B1C-BA22-7AC78AB2EFDE}" type="datetimeFigureOut">
               <a:rPr lang="nl-NL" smtClean="0"/>
-              <a:t>31-1-2025</a:t>
+              <a:t>8-2-2025</a:t>
             </a:fld>
             <a:endParaRPr lang="nl-NL" dirty="0"/>
           </a:p>
@@ -2013,7 +2213,7 @@
           <a:p>
             <a:fld id="{D64660CB-3018-4B1C-BA22-7AC78AB2EFDE}" type="datetimeFigureOut">
               <a:rPr lang="nl-NL" smtClean="0"/>
-              <a:t>31-1-2025</a:t>
+              <a:t>8-2-2025</a:t>
             </a:fld>
             <a:endParaRPr lang="nl-NL" dirty="0"/>
           </a:p>
@@ -2428,7 +2628,7 @@
           <a:p>
             <a:fld id="{D64660CB-3018-4B1C-BA22-7AC78AB2EFDE}" type="datetimeFigureOut">
               <a:rPr lang="nl-NL" smtClean="0"/>
-              <a:t>31-1-2025</a:t>
+              <a:t>8-2-2025</a:t>
             </a:fld>
             <a:endParaRPr lang="nl-NL" dirty="0"/>
           </a:p>
@@ -2570,7 +2770,7 @@
           <a:p>
             <a:fld id="{D64660CB-3018-4B1C-BA22-7AC78AB2EFDE}" type="datetimeFigureOut">
               <a:rPr lang="nl-NL" smtClean="0"/>
-              <a:t>31-1-2025</a:t>
+              <a:t>8-2-2025</a:t>
             </a:fld>
             <a:endParaRPr lang="nl-NL" dirty="0"/>
           </a:p>
@@ -2683,7 +2883,7 @@
           <a:p>
             <a:fld id="{D64660CB-3018-4B1C-BA22-7AC78AB2EFDE}" type="datetimeFigureOut">
               <a:rPr lang="nl-NL" smtClean="0"/>
-              <a:t>31-1-2025</a:t>
+              <a:t>8-2-2025</a:t>
             </a:fld>
             <a:endParaRPr lang="nl-NL" dirty="0"/>
           </a:p>
@@ -2996,7 +3196,7 @@
           <a:p>
             <a:fld id="{D64660CB-3018-4B1C-BA22-7AC78AB2EFDE}" type="datetimeFigureOut">
               <a:rPr lang="nl-NL" smtClean="0"/>
-              <a:t>31-1-2025</a:t>
+              <a:t>8-2-2025</a:t>
             </a:fld>
             <a:endParaRPr lang="nl-NL" dirty="0"/>
           </a:p>
@@ -3285,7 +3485,7 @@
           <a:p>
             <a:fld id="{D64660CB-3018-4B1C-BA22-7AC78AB2EFDE}" type="datetimeFigureOut">
               <a:rPr lang="nl-NL" smtClean="0"/>
-              <a:t>31-1-2025</a:t>
+              <a:t>8-2-2025</a:t>
             </a:fld>
             <a:endParaRPr lang="nl-NL" dirty="0"/>
           </a:p>
@@ -3528,7 +3728,7 @@
           <a:p>
             <a:fld id="{D64660CB-3018-4B1C-BA22-7AC78AB2EFDE}" type="datetimeFigureOut">
               <a:rPr lang="nl-NL" smtClean="0"/>
-              <a:t>31-1-2025</a:t>
+              <a:t>8-2-2025</a:t>
             </a:fld>
             <a:endParaRPr lang="nl-NL" dirty="0"/>
           </a:p>
@@ -5433,7 +5633,7 @@
           <p:nvPr/>
         </p:nvPicPr>
         <p:blipFill>
-          <a:blip r:embed="rId2">
+          <a:blip r:embed="rId3">
             <a:extLst>
               <a:ext uri="{28A0092B-C50C-407E-A947-70E740481C1C}">
                 <a14:useLocalDpi xmlns:a14="http://schemas.microsoft.com/office/drawing/2010/main" val="0"/>
@@ -6164,13 +6364,13 @@
   <p:clrMapOvr>
     <a:masterClrMapping/>
   </p:clrMapOvr>
-  <mc:AlternateContent xmlns:mc="http://schemas.openxmlformats.org/markup-compatibility/2006">
-    <mc:Choice xmlns:p14="http://schemas.microsoft.com/office/powerpoint/2010/main" Requires="p14">
+  <mc:AlternateContent xmlns:mc="http://schemas.openxmlformats.org/markup-compatibility/2006" xmlns:p14="http://schemas.microsoft.com/office/powerpoint/2010/main">
+    <mc:Choice Requires="p14">
       <p:transition spd="med" p14:dur="700">
         <p:fade/>
       </p:transition>
     </mc:Choice>
-    <mc:Fallback>
+    <mc:Fallback xmlns="">
       <p:transition spd="med">
         <p:fade/>
       </p:transition>
@@ -6991,4 +7191,319 @@
     </a:ext>
   </a:extLst>
 </a:theme>
+</file>
+
+<file path=ppt/theme/theme2.xml><?xml version="1.0" encoding="utf-8"?>
+<a:theme xmlns:a="http://schemas.openxmlformats.org/drawingml/2006/main" name="Kantoorthema">
+  <a:themeElements>
+    <a:clrScheme name="Office">
+      <a:dk1>
+        <a:sysClr val="windowText" lastClr="000000"/>
+      </a:dk1>
+      <a:lt1>
+        <a:sysClr val="window" lastClr="FFFFFF"/>
+      </a:lt1>
+      <a:dk2>
+        <a:srgbClr val="0E2841"/>
+      </a:dk2>
+      <a:lt2>
+        <a:srgbClr val="E8E8E8"/>
+      </a:lt2>
+      <a:accent1>
+        <a:srgbClr val="156082"/>
+      </a:accent1>
+      <a:accent2>
+        <a:srgbClr val="E97132"/>
+      </a:accent2>
+      <a:accent3>
+        <a:srgbClr val="196B24"/>
+      </a:accent3>
+      <a:accent4>
+        <a:srgbClr val="0F9ED5"/>
+      </a:accent4>
+      <a:accent5>
+        <a:srgbClr val="A02B93"/>
+      </a:accent5>
+      <a:accent6>
+        <a:srgbClr val="4EA72E"/>
+      </a:accent6>
+      <a:hlink>
+        <a:srgbClr val="467886"/>
+      </a:hlink>
+      <a:folHlink>
+        <a:srgbClr val="96607D"/>
+      </a:folHlink>
+    </a:clrScheme>
+    <a:fontScheme name="Office">
+      <a:majorFont>
+        <a:latin typeface="Aptos Display" panose="02110004020202020204"/>
+        <a:ea typeface=""/>
+        <a:cs typeface=""/>
+        <a:font script="Jpan" typeface="游ゴシック Light"/>
+        <a:font script="Hang" typeface="맑은 고딕"/>
+        <a:font script="Hans" typeface="等线 Light"/>
+        <a:font script="Hant" typeface="新細明體"/>
+        <a:font script="Arab" typeface="Times New Roman"/>
+        <a:font script="Hebr" typeface="Times New Roman"/>
+        <a:font script="Thai" typeface="Angsana New"/>
+        <a:font script="Ethi" typeface="Nyala"/>
+        <a:font script="Beng" typeface="Vrinda"/>
+        <a:font script="Gujr" typeface="Shruti"/>
+        <a:font script="Khmr" typeface="MoolBoran"/>
+        <a:font script="Knda" typeface="Tunga"/>
+        <a:font script="Guru" typeface="Raavi"/>
+        <a:font script="Cans" typeface="Euphemia"/>
+        <a:font script="Cher" typeface="Plantagenet Cherokee"/>
+        <a:font script="Yiii" typeface="Microsoft Yi Baiti"/>
+        <a:font script="Tibt" typeface="Microsoft Himalaya"/>
+        <a:font script="Thaa" typeface="MV Boli"/>
+        <a:font script="Deva" typeface="Mangal"/>
+        <a:font script="Telu" typeface="Gautami"/>
+        <a:font script="Taml" typeface="Latha"/>
+        <a:font script="Syrc" typeface="Estrangelo Edessa"/>
+        <a:font script="Orya" typeface="Kalinga"/>
+        <a:font script="Mlym" typeface="Kartika"/>
+        <a:font script="Laoo" typeface="DokChampa"/>
+        <a:font script="Sinh" typeface="Iskoola Pota"/>
+        <a:font script="Mong" typeface="Mongolian Baiti"/>
+        <a:font script="Viet" typeface="Times New Roman"/>
+        <a:font script="Uigh" typeface="Microsoft Uighur"/>
+        <a:font script="Geor" typeface="Sylfaen"/>
+        <a:font script="Armn" typeface="Arial"/>
+        <a:font script="Bugi" typeface="Leelawadee UI"/>
+        <a:font script="Bopo" typeface="Microsoft JhengHei"/>
+        <a:font script="Java" typeface="Javanese Text"/>
+        <a:font script="Lisu" typeface="Segoe UI"/>
+        <a:font script="Mymr" typeface="Myanmar Text"/>
+        <a:font script="Nkoo" typeface="Ebrima"/>
+        <a:font script="Olck" typeface="Nirmala UI"/>
+        <a:font script="Osma" typeface="Ebrima"/>
+        <a:font script="Phag" typeface="Phagspa"/>
+        <a:font script="Syrn" typeface="Estrangelo Edessa"/>
+        <a:font script="Syrj" typeface="Estrangelo Edessa"/>
+        <a:font script="Syre" typeface="Estrangelo Edessa"/>
+        <a:font script="Sora" typeface="Nirmala UI"/>
+        <a:font script="Tale" typeface="Microsoft Tai Le"/>
+        <a:font script="Talu" typeface="Microsoft New Tai Lue"/>
+        <a:font script="Tfng" typeface="Ebrima"/>
+      </a:majorFont>
+      <a:minorFont>
+        <a:latin typeface="Aptos" panose="02110004020202020204"/>
+        <a:ea typeface=""/>
+        <a:cs typeface=""/>
+        <a:font script="Jpan" typeface="游ゴシック"/>
+        <a:font script="Hang" typeface="맑은 고딕"/>
+        <a:font script="Hans" typeface="等线"/>
+        <a:font script="Hant" typeface="新細明體"/>
+        <a:font script="Arab" typeface="Arial"/>
+        <a:font script="Hebr" typeface="Arial"/>
+        <a:font script="Thai" typeface="Cordia New"/>
+        <a:font script="Ethi" typeface="Nyala"/>
+        <a:font script="Beng" typeface="Vrinda"/>
+        <a:font script="Gujr" typeface="Shruti"/>
+        <a:font script="Khmr" typeface="DaunPenh"/>
+        <a:font script="Knda" typeface="Tunga"/>
+        <a:font script="Guru" typeface="Raavi"/>
+        <a:font script="Cans" typeface="Euphemia"/>
+        <a:font script="Cher" typeface="Plantagenet Cherokee"/>
+        <a:font script="Yiii" typeface="Microsoft Yi Baiti"/>
+        <a:font script="Tibt" typeface="Microsoft Himalaya"/>
+        <a:font script="Thaa" typeface="MV Boli"/>
+        <a:font script="Deva" typeface="Mangal"/>
+        <a:font script="Telu" typeface="Gautami"/>
+        <a:font script="Taml" typeface="Latha"/>
+        <a:font script="Syrc" typeface="Estrangelo Edessa"/>
+        <a:font script="Orya" typeface="Kalinga"/>
+        <a:font script="Mlym" typeface="Kartika"/>
+        <a:font script="Laoo" typeface="DokChampa"/>
+        <a:font script="Sinh" typeface="Iskoola Pota"/>
+        <a:font script="Mong" typeface="Mongolian Baiti"/>
+        <a:font script="Viet" typeface="Arial"/>
+        <a:font script="Uigh" typeface="Microsoft Uighur"/>
+        <a:font script="Geor" typeface="Sylfaen"/>
+        <a:font script="Armn" typeface="Arial"/>
+        <a:font script="Bugi" typeface="Leelawadee UI"/>
+        <a:font script="Bopo" typeface="Microsoft JhengHei"/>
+        <a:font script="Java" typeface="Javanese Text"/>
+        <a:font script="Lisu" typeface="Segoe UI"/>
+        <a:font script="Mymr" typeface="Myanmar Text"/>
+        <a:font script="Nkoo" typeface="Ebrima"/>
+        <a:font script="Olck" typeface="Nirmala UI"/>
+        <a:font script="Osma" typeface="Ebrima"/>
+        <a:font script="Phag" typeface="Phagspa"/>
+        <a:font script="Syrn" typeface="Estrangelo Edessa"/>
+        <a:font script="Syrj" typeface="Estrangelo Edessa"/>
+        <a:font script="Syre" typeface="Estrangelo Edessa"/>
+        <a:font script="Sora" typeface="Nirmala UI"/>
+        <a:font script="Tale" typeface="Microsoft Tai Le"/>
+        <a:font script="Talu" typeface="Microsoft New Tai Lue"/>
+        <a:font script="Tfng" typeface="Ebrima"/>
+      </a:minorFont>
+    </a:fontScheme>
+    <a:fmtScheme name="Office">
+      <a:fillStyleLst>
+        <a:solidFill>
+          <a:schemeClr val="phClr"/>
+        </a:solidFill>
+        <a:gradFill rotWithShape="1">
+          <a:gsLst>
+            <a:gs pos="0">
+              <a:schemeClr val="phClr">
+                <a:lumMod val="110000"/>
+                <a:satMod val="105000"/>
+                <a:tint val="67000"/>
+              </a:schemeClr>
+            </a:gs>
+            <a:gs pos="50000">
+              <a:schemeClr val="phClr">
+                <a:lumMod val="105000"/>
+                <a:satMod val="103000"/>
+                <a:tint val="73000"/>
+              </a:schemeClr>
+            </a:gs>
+            <a:gs pos="100000">
+              <a:schemeClr val="phClr">
+                <a:lumMod val="105000"/>
+                <a:satMod val="109000"/>
+                <a:tint val="81000"/>
+              </a:schemeClr>
+            </a:gs>
+          </a:gsLst>
+          <a:lin ang="5400000" scaled="0"/>
+        </a:gradFill>
+        <a:gradFill rotWithShape="1">
+          <a:gsLst>
+            <a:gs pos="0">
+              <a:schemeClr val="phClr">
+                <a:satMod val="103000"/>
+                <a:lumMod val="102000"/>
+                <a:tint val="94000"/>
+              </a:schemeClr>
+            </a:gs>
+            <a:gs pos="50000">
+              <a:schemeClr val="phClr">
+                <a:satMod val="110000"/>
+                <a:lumMod val="100000"/>
+                <a:shade val="100000"/>
+              </a:schemeClr>
+            </a:gs>
+            <a:gs pos="100000">
+              <a:schemeClr val="phClr">
+                <a:lumMod val="99000"/>
+                <a:satMod val="120000"/>
+                <a:shade val="78000"/>
+              </a:schemeClr>
+            </a:gs>
+          </a:gsLst>
+          <a:lin ang="5400000" scaled="0"/>
+        </a:gradFill>
+      </a:fillStyleLst>
+      <a:lnStyleLst>
+        <a:ln w="12700" cap="flat" cmpd="sng" algn="ctr">
+          <a:solidFill>
+            <a:schemeClr val="phClr"/>
+          </a:solidFill>
+          <a:prstDash val="solid"/>
+          <a:miter lim="800000"/>
+        </a:ln>
+        <a:ln w="19050" cap="flat" cmpd="sng" algn="ctr">
+          <a:solidFill>
+            <a:schemeClr val="phClr"/>
+          </a:solidFill>
+          <a:prstDash val="solid"/>
+          <a:miter lim="800000"/>
+        </a:ln>
+        <a:ln w="25400" cap="flat" cmpd="sng" algn="ctr">
+          <a:solidFill>
+            <a:schemeClr val="phClr"/>
+          </a:solidFill>
+          <a:prstDash val="solid"/>
+          <a:miter lim="800000"/>
+        </a:ln>
+      </a:lnStyleLst>
+      <a:effectStyleLst>
+        <a:effectStyle>
+          <a:effectLst/>
+        </a:effectStyle>
+        <a:effectStyle>
+          <a:effectLst/>
+        </a:effectStyle>
+        <a:effectStyle>
+          <a:effectLst>
+            <a:outerShdw blurRad="57150" dist="19050" dir="5400000" algn="ctr" rotWithShape="0">
+              <a:srgbClr val="000000">
+                <a:alpha val="63000"/>
+              </a:srgbClr>
+            </a:outerShdw>
+          </a:effectLst>
+        </a:effectStyle>
+      </a:effectStyleLst>
+      <a:bgFillStyleLst>
+        <a:solidFill>
+          <a:schemeClr val="phClr"/>
+        </a:solidFill>
+        <a:solidFill>
+          <a:schemeClr val="phClr">
+            <a:tint val="95000"/>
+            <a:satMod val="170000"/>
+          </a:schemeClr>
+        </a:solidFill>
+        <a:gradFill rotWithShape="1">
+          <a:gsLst>
+            <a:gs pos="0">
+              <a:schemeClr val="phClr">
+                <a:tint val="93000"/>
+                <a:satMod val="150000"/>
+                <a:shade val="98000"/>
+                <a:lumMod val="102000"/>
+              </a:schemeClr>
+            </a:gs>
+            <a:gs pos="50000">
+              <a:schemeClr val="phClr">
+                <a:tint val="98000"/>
+                <a:satMod val="130000"/>
+                <a:shade val="90000"/>
+                <a:lumMod val="103000"/>
+              </a:schemeClr>
+            </a:gs>
+            <a:gs pos="100000">
+              <a:schemeClr val="phClr">
+                <a:shade val="63000"/>
+                <a:satMod val="120000"/>
+              </a:schemeClr>
+            </a:gs>
+          </a:gsLst>
+          <a:lin ang="5400000" scaled="0"/>
+        </a:gradFill>
+      </a:bgFillStyleLst>
+    </a:fmtScheme>
+  </a:themeElements>
+  <a:objectDefaults>
+    <a:lnDef>
+      <a:spPr/>
+      <a:bodyPr/>
+      <a:lstStyle/>
+      <a:style>
+        <a:lnRef idx="2">
+          <a:schemeClr val="accent1"/>
+        </a:lnRef>
+        <a:fillRef idx="0">
+          <a:schemeClr val="accent1"/>
+        </a:fillRef>
+        <a:effectRef idx="1">
+          <a:schemeClr val="accent1"/>
+        </a:effectRef>
+        <a:fontRef idx="minor">
+          <a:schemeClr val="tx1"/>
+        </a:fontRef>
+      </a:style>
+    </a:lnDef>
+  </a:objectDefaults>
+  <a:extraClrSchemeLst/>
+  <a:extLst>
+    <a:ext uri="{05A4C25C-085E-4340-85A3-A5531E510DB2}">
+      <thm15:themeFamily xmlns:thm15="http://schemas.microsoft.com/office/thememl/2012/main" name="Office Theme" id="{2E142A2C-CD16-42D6-873A-C26D2A0506FA}" vid="{1BDDFF52-6CD6-40A5-AB3C-68EB2F1E4D0A}"/>
+    </a:ext>
+  </a:extLst>
+</a:theme>
 </file>
</xml_diff>